<commit_message>
Cleaning book and vignettes. Adding wt_ord function to convenience workflow (possibly analytics later).
</commit_message>
<xml_diff>
--- a/book/assets/Presentation1.pptx
+++ b/book/assets/Presentation1.pptx
@@ -104,6 +104,11 @@
       </a:defRPr>
     </a:lvl9pPr>
   </p:defaultTextStyle>
+  <p:extLst>
+    <p:ext uri="{EFAFB233-063F-42B5-8137-9DF3F51BA10A}">
+      <p15:sldGuideLst xmlns:p15="http://schemas.microsoft.com/office/powerpoint/2012/main"/>
+    </p:ext>
+  </p:extLst>
 </p:presentation>
 </file>
 
@@ -238,7 +243,7 @@
           <a:p>
             <a:fld id="{B23D9760-FF74-A945-B648-430B90E24A94}" type="datetimeFigureOut">
               <a:rPr lang="en-US" smtClean="0"/>
-              <a:t>1/13/23</a:t>
+              <a:t>3/3/23</a:t>
             </a:fld>
             <a:endParaRPr lang="en-US"/>
           </a:p>
@@ -408,7 +413,7 @@
           <a:p>
             <a:fld id="{B23D9760-FF74-A945-B648-430B90E24A94}" type="datetimeFigureOut">
               <a:rPr lang="en-US" smtClean="0"/>
-              <a:t>1/13/23</a:t>
+              <a:t>3/3/23</a:t>
             </a:fld>
             <a:endParaRPr lang="en-US"/>
           </a:p>
@@ -588,7 +593,7 @@
           <a:p>
             <a:fld id="{B23D9760-FF74-A945-B648-430B90E24A94}" type="datetimeFigureOut">
               <a:rPr lang="en-US" smtClean="0"/>
-              <a:t>1/13/23</a:t>
+              <a:t>3/3/23</a:t>
             </a:fld>
             <a:endParaRPr lang="en-US"/>
           </a:p>
@@ -758,7 +763,7 @@
           <a:p>
             <a:fld id="{B23D9760-FF74-A945-B648-430B90E24A94}" type="datetimeFigureOut">
               <a:rPr lang="en-US" smtClean="0"/>
-              <a:t>1/13/23</a:t>
+              <a:t>3/3/23</a:t>
             </a:fld>
             <a:endParaRPr lang="en-US"/>
           </a:p>
@@ -1002,7 +1007,7 @@
           <a:p>
             <a:fld id="{B23D9760-FF74-A945-B648-430B90E24A94}" type="datetimeFigureOut">
               <a:rPr lang="en-US" smtClean="0"/>
-              <a:t>1/13/23</a:t>
+              <a:t>3/3/23</a:t>
             </a:fld>
             <a:endParaRPr lang="en-US"/>
           </a:p>
@@ -1234,7 +1239,7 @@
           <a:p>
             <a:fld id="{B23D9760-FF74-A945-B648-430B90E24A94}" type="datetimeFigureOut">
               <a:rPr lang="en-US" smtClean="0"/>
-              <a:t>1/13/23</a:t>
+              <a:t>3/3/23</a:t>
             </a:fld>
             <a:endParaRPr lang="en-US"/>
           </a:p>
@@ -1601,7 +1606,7 @@
           <a:p>
             <a:fld id="{B23D9760-FF74-A945-B648-430B90E24A94}" type="datetimeFigureOut">
               <a:rPr lang="en-US" smtClean="0"/>
-              <a:t>1/13/23</a:t>
+              <a:t>3/3/23</a:t>
             </a:fld>
             <a:endParaRPr lang="en-US"/>
           </a:p>
@@ -1719,7 +1724,7 @@
           <a:p>
             <a:fld id="{B23D9760-FF74-A945-B648-430B90E24A94}" type="datetimeFigureOut">
               <a:rPr lang="en-US" smtClean="0"/>
-              <a:t>1/13/23</a:t>
+              <a:t>3/3/23</a:t>
             </a:fld>
             <a:endParaRPr lang="en-US"/>
           </a:p>
@@ -1814,7 +1819,7 @@
           <a:p>
             <a:fld id="{B23D9760-FF74-A945-B648-430B90E24A94}" type="datetimeFigureOut">
               <a:rPr lang="en-US" smtClean="0"/>
-              <a:t>1/13/23</a:t>
+              <a:t>3/3/23</a:t>
             </a:fld>
             <a:endParaRPr lang="en-US"/>
           </a:p>
@@ -2091,7 +2096,7 @@
           <a:p>
             <a:fld id="{B23D9760-FF74-A945-B648-430B90E24A94}" type="datetimeFigureOut">
               <a:rPr lang="en-US" smtClean="0"/>
-              <a:t>1/13/23</a:t>
+              <a:t>3/3/23</a:t>
             </a:fld>
             <a:endParaRPr lang="en-US"/>
           </a:p>
@@ -2348,7 +2353,7 @@
           <a:p>
             <a:fld id="{B23D9760-FF74-A945-B648-430B90E24A94}" type="datetimeFigureOut">
               <a:rPr lang="en-US" smtClean="0"/>
-              <a:t>1/13/23</a:t>
+              <a:t>3/3/23</a:t>
             </a:fld>
             <a:endParaRPr lang="en-US"/>
           </a:p>
@@ -2561,7 +2566,7 @@
           <a:p>
             <a:fld id="{B23D9760-FF74-A945-B648-430B90E24A94}" type="datetimeFigureOut">
               <a:rPr lang="en-US" smtClean="0"/>
-              <a:t>1/13/23</a:t>
+              <a:t>3/3/23</a:t>
             </a:fld>
             <a:endParaRPr lang="en-US"/>
           </a:p>
@@ -2980,7 +2985,7 @@
         </p:nvGrpSpPr>
         <p:grpSpPr>
           <a:xfrm>
-            <a:off x="464233" y="-1819556"/>
+            <a:off x="464233" y="-1126829"/>
             <a:ext cx="7920000" cy="10080000"/>
             <a:chOff x="464233" y="-1819556"/>
             <a:chExt cx="7920000" cy="10080000"/>
@@ -3108,8 +3113,8 @@
           </p:nvSpPr>
           <p:spPr>
             <a:xfrm>
-              <a:off x="609600" y="1134533"/>
-              <a:ext cx="6451600" cy="1091231"/>
+              <a:off x="609600" y="1182624"/>
+              <a:ext cx="6437376" cy="769441"/>
             </a:xfrm>
             <a:prstGeom prst="rect">
               <a:avLst/>
@@ -3129,7 +3134,14 @@
             </a:bodyPr>
             <a:lstStyle/>
             <a:p>
-              <a:endParaRPr lang="en-US" dirty="0"/>
+              <a:r>
+                <a:rPr lang="en-US" sz="4400" dirty="0">
+                  <a:solidFill>
+                    <a:schemeClr val="bg1"/>
+                  </a:solidFill>
+                </a:rPr>
+                <a:t>--TEMPLATE FOR COVER--</a:t>
+              </a:r>
             </a:p>
           </p:txBody>
         </p:sp>
@@ -3169,7 +3181,7 @@
                   <a:latin typeface="Roboto Light" panose="02000000000000000000" pitchFamily="2" charset="0"/>
                   <a:ea typeface="Roboto Light" panose="02000000000000000000" pitchFamily="2" charset="0"/>
                 </a:rPr>
-                <a:t>Environmental sensor data analysis with R</a:t>
+                <a:t>Environmental sensor data management and analysis with R</a:t>
               </a:r>
             </a:p>
           </p:txBody>

</xml_diff>